<commit_message>
modified:   en/index.html 	modified:   en/pub.html 	new file:   img/lgq.jpg 	modified:   img/member.pptx 	modified:   zh/index.html 	modified:   zh/pub.html
</commit_message>
<xml_diff>
--- a/img/member.pptx
+++ b/img/member.pptx
@@ -270,7 +270,7 @@
           <a:p>
             <a:fld id="{26722B09-0315-4E75-BD8D-A0AB63D29779}" type="datetimeFigureOut">
               <a:rPr lang="zh-CN" altLang="en-US" smtClean="0"/>
-              <a:t>2019/9/25</a:t>
+              <a:t>2020/8/8</a:t>
             </a:fld>
             <a:endParaRPr lang="zh-CN" altLang="en-US"/>
           </a:p>
@@ -468,7 +468,7 @@
           <a:p>
             <a:fld id="{26722B09-0315-4E75-BD8D-A0AB63D29779}" type="datetimeFigureOut">
               <a:rPr lang="zh-CN" altLang="en-US" smtClean="0"/>
-              <a:t>2019/9/25</a:t>
+              <a:t>2020/8/8</a:t>
             </a:fld>
             <a:endParaRPr lang="zh-CN" altLang="en-US"/>
           </a:p>
@@ -676,7 +676,7 @@
           <a:p>
             <a:fld id="{26722B09-0315-4E75-BD8D-A0AB63D29779}" type="datetimeFigureOut">
               <a:rPr lang="zh-CN" altLang="en-US" smtClean="0"/>
-              <a:t>2019/9/25</a:t>
+              <a:t>2020/8/8</a:t>
             </a:fld>
             <a:endParaRPr lang="zh-CN" altLang="en-US"/>
           </a:p>
@@ -874,7 +874,7 @@
           <a:p>
             <a:fld id="{26722B09-0315-4E75-BD8D-A0AB63D29779}" type="datetimeFigureOut">
               <a:rPr lang="zh-CN" altLang="en-US" smtClean="0"/>
-              <a:t>2019/9/25</a:t>
+              <a:t>2020/8/8</a:t>
             </a:fld>
             <a:endParaRPr lang="zh-CN" altLang="en-US"/>
           </a:p>
@@ -1149,7 +1149,7 @@
           <a:p>
             <a:fld id="{26722B09-0315-4E75-BD8D-A0AB63D29779}" type="datetimeFigureOut">
               <a:rPr lang="zh-CN" altLang="en-US" smtClean="0"/>
-              <a:t>2019/9/25</a:t>
+              <a:t>2020/8/8</a:t>
             </a:fld>
             <a:endParaRPr lang="zh-CN" altLang="en-US"/>
           </a:p>
@@ -1414,7 +1414,7 @@
           <a:p>
             <a:fld id="{26722B09-0315-4E75-BD8D-A0AB63D29779}" type="datetimeFigureOut">
               <a:rPr lang="zh-CN" altLang="en-US" smtClean="0"/>
-              <a:t>2019/9/25</a:t>
+              <a:t>2020/8/8</a:t>
             </a:fld>
             <a:endParaRPr lang="zh-CN" altLang="en-US"/>
           </a:p>
@@ -1826,7 +1826,7 @@
           <a:p>
             <a:fld id="{26722B09-0315-4E75-BD8D-A0AB63D29779}" type="datetimeFigureOut">
               <a:rPr lang="zh-CN" altLang="en-US" smtClean="0"/>
-              <a:t>2019/9/25</a:t>
+              <a:t>2020/8/8</a:t>
             </a:fld>
             <a:endParaRPr lang="zh-CN" altLang="en-US"/>
           </a:p>
@@ -1967,7 +1967,7 @@
           <a:p>
             <a:fld id="{26722B09-0315-4E75-BD8D-A0AB63D29779}" type="datetimeFigureOut">
               <a:rPr lang="zh-CN" altLang="en-US" smtClean="0"/>
-              <a:t>2019/9/25</a:t>
+              <a:t>2020/8/8</a:t>
             </a:fld>
             <a:endParaRPr lang="zh-CN" altLang="en-US"/>
           </a:p>
@@ -2080,7 +2080,7 @@
           <a:p>
             <a:fld id="{26722B09-0315-4E75-BD8D-A0AB63D29779}" type="datetimeFigureOut">
               <a:rPr lang="zh-CN" altLang="en-US" smtClean="0"/>
-              <a:t>2019/9/25</a:t>
+              <a:t>2020/8/8</a:t>
             </a:fld>
             <a:endParaRPr lang="zh-CN" altLang="en-US"/>
           </a:p>
@@ -2391,7 +2391,7 @@
           <a:p>
             <a:fld id="{26722B09-0315-4E75-BD8D-A0AB63D29779}" type="datetimeFigureOut">
               <a:rPr lang="zh-CN" altLang="en-US" smtClean="0"/>
-              <a:t>2019/9/25</a:t>
+              <a:t>2020/8/8</a:t>
             </a:fld>
             <a:endParaRPr lang="zh-CN" altLang="en-US"/>
           </a:p>
@@ -2679,7 +2679,7 @@
           <a:p>
             <a:fld id="{26722B09-0315-4E75-BD8D-A0AB63D29779}" type="datetimeFigureOut">
               <a:rPr lang="zh-CN" altLang="en-US" smtClean="0"/>
-              <a:t>2019/9/25</a:t>
+              <a:t>2020/8/8</a:t>
             </a:fld>
             <a:endParaRPr lang="zh-CN" altLang="en-US"/>
           </a:p>
@@ -2920,7 +2920,7 @@
           <a:p>
             <a:fld id="{26722B09-0315-4E75-BD8D-A0AB63D29779}" type="datetimeFigureOut">
               <a:rPr lang="zh-CN" altLang="en-US" smtClean="0"/>
-              <a:t>2019/9/25</a:t>
+              <a:t>2020/8/8</a:t>
             </a:fld>
             <a:endParaRPr lang="zh-CN" altLang="en-US"/>
           </a:p>
@@ -3389,34 +3389,27 @@
       </p:sp>
       <p:pic>
         <p:nvPicPr>
-          <p:cNvPr id="5" name="图片 4">
-            <a:extLst>
-              <a:ext uri="{FF2B5EF4-FFF2-40B4-BE49-F238E27FC236}">
-                <a16:creationId xmlns:a16="http://schemas.microsoft.com/office/drawing/2014/main" id="{3B611906-7A78-4C3B-81E4-9A555B0F0E14}"/>
-              </a:ext>
-            </a:extLst>
-          </p:cNvPr>
+          <p:cNvPr id="8" name="图片 7"/>
           <p:cNvPicPr>
             <a:picLocks noChangeAspect="1"/>
           </p:cNvPicPr>
           <p:nvPr/>
         </p:nvPicPr>
-        <p:blipFill>
-          <a:blip r:embed="rId2">
+        <p:blipFill rotWithShape="1">
+          <a:blip r:embed="rId2" cstate="hqprint">
             <a:extLst>
               <a:ext uri="{28A0092B-C50C-407E-A947-70E740481C1C}">
                 <a14:useLocalDpi xmlns:a14="http://schemas.microsoft.com/office/drawing/2010/main" val="0"/>
               </a:ext>
             </a:extLst>
           </a:blip>
-          <a:stretch>
-            <a:fillRect/>
-          </a:stretch>
+          <a:srcRect l="-10606" t="-2" r="-12222" b="6553"/>
+          <a:stretch/>
         </p:blipFill>
         <p:spPr>
           <a:xfrm>
-            <a:off x="1698969" y="80963"/>
-            <a:ext cx="5154216" cy="6858000"/>
+            <a:off x="9005455" y="448107"/>
+            <a:ext cx="390372" cy="388800"/>
           </a:xfrm>
           <a:prstGeom prst="rect">
             <a:avLst/>
@@ -3425,13 +3418,7 @@
       </p:pic>
       <p:pic>
         <p:nvPicPr>
-          <p:cNvPr id="7" name="图片 6">
-            <a:extLst>
-              <a:ext uri="{FF2B5EF4-FFF2-40B4-BE49-F238E27FC236}">
-                <a16:creationId xmlns:a16="http://schemas.microsoft.com/office/drawing/2014/main" id="{883BABD3-AD4F-4079-A456-C20E8981302A}"/>
-              </a:ext>
-            </a:extLst>
-          </p:cNvPr>
+          <p:cNvPr id="6" name="图片 5"/>
           <p:cNvPicPr>
             <a:picLocks noChangeAspect="1"/>
           </p:cNvPicPr>
@@ -3451,8 +3438,8 @@
         </p:blipFill>
         <p:spPr>
           <a:xfrm>
-            <a:off x="6573627" y="399495"/>
-            <a:ext cx="5134826" cy="6858000"/>
+            <a:off x="5900928" y="3233928"/>
+            <a:ext cx="390144" cy="390144"/>
           </a:xfrm>
           <a:prstGeom prst="rect">
             <a:avLst/>

</xml_diff>

<commit_message>
modified:   en/index.html 	modified:   en/member.html 	new file:   img/guozl.jpg 	modified:   img/member.pptx 	modified:   zh/index.html 	modified:   zh/member.html
</commit_message>
<xml_diff>
--- a/img/member.pptx
+++ b/img/member.pptx
@@ -270,7 +270,7 @@
           <a:p>
             <a:fld id="{26722B09-0315-4E75-BD8D-A0AB63D29779}" type="datetimeFigureOut">
               <a:rPr lang="zh-CN" altLang="en-US" smtClean="0"/>
-              <a:t>2020/8/8</a:t>
+              <a:t>2020/8/29</a:t>
             </a:fld>
             <a:endParaRPr lang="zh-CN" altLang="en-US"/>
           </a:p>
@@ -468,7 +468,7 @@
           <a:p>
             <a:fld id="{26722B09-0315-4E75-BD8D-A0AB63D29779}" type="datetimeFigureOut">
               <a:rPr lang="zh-CN" altLang="en-US" smtClean="0"/>
-              <a:t>2020/8/8</a:t>
+              <a:t>2020/8/29</a:t>
             </a:fld>
             <a:endParaRPr lang="zh-CN" altLang="en-US"/>
           </a:p>
@@ -676,7 +676,7 @@
           <a:p>
             <a:fld id="{26722B09-0315-4E75-BD8D-A0AB63D29779}" type="datetimeFigureOut">
               <a:rPr lang="zh-CN" altLang="en-US" smtClean="0"/>
-              <a:t>2020/8/8</a:t>
+              <a:t>2020/8/29</a:t>
             </a:fld>
             <a:endParaRPr lang="zh-CN" altLang="en-US"/>
           </a:p>
@@ -874,7 +874,7 @@
           <a:p>
             <a:fld id="{26722B09-0315-4E75-BD8D-A0AB63D29779}" type="datetimeFigureOut">
               <a:rPr lang="zh-CN" altLang="en-US" smtClean="0"/>
-              <a:t>2020/8/8</a:t>
+              <a:t>2020/8/29</a:t>
             </a:fld>
             <a:endParaRPr lang="zh-CN" altLang="en-US"/>
           </a:p>
@@ -1149,7 +1149,7 @@
           <a:p>
             <a:fld id="{26722B09-0315-4E75-BD8D-A0AB63D29779}" type="datetimeFigureOut">
               <a:rPr lang="zh-CN" altLang="en-US" smtClean="0"/>
-              <a:t>2020/8/8</a:t>
+              <a:t>2020/8/29</a:t>
             </a:fld>
             <a:endParaRPr lang="zh-CN" altLang="en-US"/>
           </a:p>
@@ -1414,7 +1414,7 @@
           <a:p>
             <a:fld id="{26722B09-0315-4E75-BD8D-A0AB63D29779}" type="datetimeFigureOut">
               <a:rPr lang="zh-CN" altLang="en-US" smtClean="0"/>
-              <a:t>2020/8/8</a:t>
+              <a:t>2020/8/29</a:t>
             </a:fld>
             <a:endParaRPr lang="zh-CN" altLang="en-US"/>
           </a:p>
@@ -1826,7 +1826,7 @@
           <a:p>
             <a:fld id="{26722B09-0315-4E75-BD8D-A0AB63D29779}" type="datetimeFigureOut">
               <a:rPr lang="zh-CN" altLang="en-US" smtClean="0"/>
-              <a:t>2020/8/8</a:t>
+              <a:t>2020/8/29</a:t>
             </a:fld>
             <a:endParaRPr lang="zh-CN" altLang="en-US"/>
           </a:p>
@@ -1967,7 +1967,7 @@
           <a:p>
             <a:fld id="{26722B09-0315-4E75-BD8D-A0AB63D29779}" type="datetimeFigureOut">
               <a:rPr lang="zh-CN" altLang="en-US" smtClean="0"/>
-              <a:t>2020/8/8</a:t>
+              <a:t>2020/8/29</a:t>
             </a:fld>
             <a:endParaRPr lang="zh-CN" altLang="en-US"/>
           </a:p>
@@ -2080,7 +2080,7 @@
           <a:p>
             <a:fld id="{26722B09-0315-4E75-BD8D-A0AB63D29779}" type="datetimeFigureOut">
               <a:rPr lang="zh-CN" altLang="en-US" smtClean="0"/>
-              <a:t>2020/8/8</a:t>
+              <a:t>2020/8/29</a:t>
             </a:fld>
             <a:endParaRPr lang="zh-CN" altLang="en-US"/>
           </a:p>
@@ -2391,7 +2391,7 @@
           <a:p>
             <a:fld id="{26722B09-0315-4E75-BD8D-A0AB63D29779}" type="datetimeFigureOut">
               <a:rPr lang="zh-CN" altLang="en-US" smtClean="0"/>
-              <a:t>2020/8/8</a:t>
+              <a:t>2020/8/29</a:t>
             </a:fld>
             <a:endParaRPr lang="zh-CN" altLang="en-US"/>
           </a:p>
@@ -2679,7 +2679,7 @@
           <a:p>
             <a:fld id="{26722B09-0315-4E75-BD8D-A0AB63D29779}" type="datetimeFigureOut">
               <a:rPr lang="zh-CN" altLang="en-US" smtClean="0"/>
-              <a:t>2020/8/8</a:t>
+              <a:t>2020/8/29</a:t>
             </a:fld>
             <a:endParaRPr lang="zh-CN" altLang="en-US"/>
           </a:p>
@@ -2920,7 +2920,7 @@
           <a:p>
             <a:fld id="{26722B09-0315-4E75-BD8D-A0AB63D29779}" type="datetimeFigureOut">
               <a:rPr lang="zh-CN" altLang="en-US" smtClean="0"/>
-              <a:t>2020/8/8</a:t>
+              <a:t>2020/8/29</a:t>
             </a:fld>
             <a:endParaRPr lang="zh-CN" altLang="en-US"/>
           </a:p>
@@ -3446,6 +3446,65 @@
           </a:prstGeom>
         </p:spPr>
       </p:pic>
+      <p:pic>
+        <p:nvPicPr>
+          <p:cNvPr id="4" name="图片 3"/>
+          <p:cNvPicPr>
+            <a:picLocks noChangeAspect="1"/>
+          </p:cNvPicPr>
+          <p:nvPr/>
+        </p:nvPicPr>
+        <p:blipFill>
+          <a:blip r:embed="rId4">
+            <a:extLst>
+              <a:ext uri="{28A0092B-C50C-407E-A947-70E740481C1C}">
+                <a14:useLocalDpi xmlns:a14="http://schemas.microsoft.com/office/drawing/2010/main" val="0"/>
+              </a:ext>
+            </a:extLst>
+          </a:blip>
+          <a:stretch>
+            <a:fillRect/>
+          </a:stretch>
+        </p:blipFill>
+        <p:spPr>
+          <a:xfrm>
+            <a:off x="8387841" y="1369646"/>
+            <a:ext cx="812800" cy="812800"/>
+          </a:xfrm>
+          <a:prstGeom prst="rect">
+            <a:avLst/>
+          </a:prstGeom>
+        </p:spPr>
+      </p:pic>
+      <p:pic>
+        <p:nvPicPr>
+          <p:cNvPr id="5" name="图片 4"/>
+          <p:cNvPicPr>
+            <a:picLocks noChangeAspect="1"/>
+          </p:cNvPicPr>
+          <p:nvPr/>
+        </p:nvPicPr>
+        <p:blipFill rotWithShape="1">
+          <a:blip r:embed="rId5">
+            <a:extLst>
+              <a:ext uri="{28A0092B-C50C-407E-A947-70E740481C1C}">
+                <a14:useLocalDpi xmlns:a14="http://schemas.microsoft.com/office/drawing/2010/main" val="0"/>
+              </a:ext>
+            </a:extLst>
+          </a:blip>
+          <a:srcRect l="-15830" t="1" r="-2486" b="5965"/>
+          <a:stretch/>
+        </p:blipFill>
+        <p:spPr>
+          <a:xfrm>
+            <a:off x="7272175" y="393021"/>
+            <a:ext cx="391351" cy="388800"/>
+          </a:xfrm>
+          <a:prstGeom prst="rect">
+            <a:avLst/>
+          </a:prstGeom>
+        </p:spPr>
+      </p:pic>
     </p:spTree>
     <p:extLst>
       <p:ext uri="{BB962C8B-B14F-4D97-AF65-F5344CB8AC3E}">

</xml_diff>

<commit_message>
modified:   en/member.html 	new file:   img/jia_liu.jpg 	new file:   img/jia_liu2.jpg 	new file:   img/jia_liu3.jpg 	modified:   img/member.pptx 	new file:   img/yr_hu.jpg 	new file:   img/yr_hu2.jpg 	modified:   zh/member.html
</commit_message>
<xml_diff>
--- a/img/member.pptx
+++ b/img/member.pptx
@@ -270,7 +270,7 @@
           <a:p>
             <a:fld id="{26722B09-0315-4E75-BD8D-A0AB63D29779}" type="datetimeFigureOut">
               <a:rPr lang="zh-CN" altLang="en-US" smtClean="0"/>
-              <a:t>2020/8/29</a:t>
+              <a:t>2021/8/24</a:t>
             </a:fld>
             <a:endParaRPr lang="zh-CN" altLang="en-US"/>
           </a:p>
@@ -468,7 +468,7 @@
           <a:p>
             <a:fld id="{26722B09-0315-4E75-BD8D-A0AB63D29779}" type="datetimeFigureOut">
               <a:rPr lang="zh-CN" altLang="en-US" smtClean="0"/>
-              <a:t>2020/8/29</a:t>
+              <a:t>2021/8/24</a:t>
             </a:fld>
             <a:endParaRPr lang="zh-CN" altLang="en-US"/>
           </a:p>
@@ -676,7 +676,7 @@
           <a:p>
             <a:fld id="{26722B09-0315-4E75-BD8D-A0AB63D29779}" type="datetimeFigureOut">
               <a:rPr lang="zh-CN" altLang="en-US" smtClean="0"/>
-              <a:t>2020/8/29</a:t>
+              <a:t>2021/8/24</a:t>
             </a:fld>
             <a:endParaRPr lang="zh-CN" altLang="en-US"/>
           </a:p>
@@ -874,7 +874,7 @@
           <a:p>
             <a:fld id="{26722B09-0315-4E75-BD8D-A0AB63D29779}" type="datetimeFigureOut">
               <a:rPr lang="zh-CN" altLang="en-US" smtClean="0"/>
-              <a:t>2020/8/29</a:t>
+              <a:t>2021/8/24</a:t>
             </a:fld>
             <a:endParaRPr lang="zh-CN" altLang="en-US"/>
           </a:p>
@@ -1149,7 +1149,7 @@
           <a:p>
             <a:fld id="{26722B09-0315-4E75-BD8D-A0AB63D29779}" type="datetimeFigureOut">
               <a:rPr lang="zh-CN" altLang="en-US" smtClean="0"/>
-              <a:t>2020/8/29</a:t>
+              <a:t>2021/8/24</a:t>
             </a:fld>
             <a:endParaRPr lang="zh-CN" altLang="en-US"/>
           </a:p>
@@ -1414,7 +1414,7 @@
           <a:p>
             <a:fld id="{26722B09-0315-4E75-BD8D-A0AB63D29779}" type="datetimeFigureOut">
               <a:rPr lang="zh-CN" altLang="en-US" smtClean="0"/>
-              <a:t>2020/8/29</a:t>
+              <a:t>2021/8/24</a:t>
             </a:fld>
             <a:endParaRPr lang="zh-CN" altLang="en-US"/>
           </a:p>
@@ -1826,7 +1826,7 @@
           <a:p>
             <a:fld id="{26722B09-0315-4E75-BD8D-A0AB63D29779}" type="datetimeFigureOut">
               <a:rPr lang="zh-CN" altLang="en-US" smtClean="0"/>
-              <a:t>2020/8/29</a:t>
+              <a:t>2021/8/24</a:t>
             </a:fld>
             <a:endParaRPr lang="zh-CN" altLang="en-US"/>
           </a:p>
@@ -1967,7 +1967,7 @@
           <a:p>
             <a:fld id="{26722B09-0315-4E75-BD8D-A0AB63D29779}" type="datetimeFigureOut">
               <a:rPr lang="zh-CN" altLang="en-US" smtClean="0"/>
-              <a:t>2020/8/29</a:t>
+              <a:t>2021/8/24</a:t>
             </a:fld>
             <a:endParaRPr lang="zh-CN" altLang="en-US"/>
           </a:p>
@@ -2080,7 +2080,7 @@
           <a:p>
             <a:fld id="{26722B09-0315-4E75-BD8D-A0AB63D29779}" type="datetimeFigureOut">
               <a:rPr lang="zh-CN" altLang="en-US" smtClean="0"/>
-              <a:t>2020/8/29</a:t>
+              <a:t>2021/8/24</a:t>
             </a:fld>
             <a:endParaRPr lang="zh-CN" altLang="en-US"/>
           </a:p>
@@ -2391,7 +2391,7 @@
           <a:p>
             <a:fld id="{26722B09-0315-4E75-BD8D-A0AB63D29779}" type="datetimeFigureOut">
               <a:rPr lang="zh-CN" altLang="en-US" smtClean="0"/>
-              <a:t>2020/8/29</a:t>
+              <a:t>2021/8/24</a:t>
             </a:fld>
             <a:endParaRPr lang="zh-CN" altLang="en-US"/>
           </a:p>
@@ -2679,7 +2679,7 @@
           <a:p>
             <a:fld id="{26722B09-0315-4E75-BD8D-A0AB63D29779}" type="datetimeFigureOut">
               <a:rPr lang="zh-CN" altLang="en-US" smtClean="0"/>
-              <a:t>2020/8/29</a:t>
+              <a:t>2021/8/24</a:t>
             </a:fld>
             <a:endParaRPr lang="zh-CN" altLang="en-US"/>
           </a:p>
@@ -2920,7 +2920,7 @@
           <a:p>
             <a:fld id="{26722B09-0315-4E75-BD8D-A0AB63D29779}" type="datetimeFigureOut">
               <a:rPr lang="zh-CN" altLang="en-US" smtClean="0"/>
-              <a:t>2020/8/29</a:t>
+              <a:t>2021/8/24</a:t>
             </a:fld>
             <a:endParaRPr lang="zh-CN" altLang="en-US"/>
           </a:p>
@@ -3505,6 +3505,65 @@
           </a:prstGeom>
         </p:spPr>
       </p:pic>
+      <p:pic>
+        <p:nvPicPr>
+          <p:cNvPr id="9" name="图片 8"/>
+          <p:cNvPicPr>
+            <a:picLocks noChangeAspect="1"/>
+          </p:cNvPicPr>
+          <p:nvPr/>
+        </p:nvPicPr>
+        <p:blipFill rotWithShape="1">
+          <a:blip r:embed="rId6">
+            <a:extLst>
+              <a:ext uri="{28A0092B-C50C-407E-A947-70E740481C1C}">
+                <a14:useLocalDpi xmlns:a14="http://schemas.microsoft.com/office/drawing/2010/main" val="0"/>
+              </a:ext>
+            </a:extLst>
+          </a:blip>
+          <a:srcRect l="2690" t="3367" r="-2690" b="-3367"/>
+          <a:stretch/>
+        </p:blipFill>
+        <p:spPr>
+          <a:xfrm>
+            <a:off x="1947392" y="173039"/>
+            <a:ext cx="5130000" cy="6831577"/>
+          </a:xfrm>
+          <a:prstGeom prst="rect">
+            <a:avLst/>
+          </a:prstGeom>
+        </p:spPr>
+      </p:pic>
+      <p:pic>
+        <p:nvPicPr>
+          <p:cNvPr id="10" name="图片 9"/>
+          <p:cNvPicPr>
+            <a:picLocks noChangeAspect="1"/>
+          </p:cNvPicPr>
+          <p:nvPr/>
+        </p:nvPicPr>
+        <p:blipFill>
+          <a:blip r:embed="rId7">
+            <a:extLst>
+              <a:ext uri="{28A0092B-C50C-407E-A947-70E740481C1C}">
+                <a14:useLocalDpi xmlns:a14="http://schemas.microsoft.com/office/drawing/2010/main" val="0"/>
+              </a:ext>
+            </a:extLst>
+          </a:blip>
+          <a:stretch>
+            <a:fillRect/>
+          </a:stretch>
+        </p:blipFill>
+        <p:spPr>
+          <a:xfrm>
+            <a:off x="7105970" y="-33528"/>
+            <a:ext cx="5130609" cy="6858000"/>
+          </a:xfrm>
+          <a:prstGeom prst="rect">
+            <a:avLst/>
+          </a:prstGeom>
+        </p:spPr>
+      </p:pic>
     </p:spTree>
     <p:extLst>
       <p:ext uri="{BB962C8B-B14F-4D97-AF65-F5344CB8AC3E}">

</xml_diff>

<commit_message>
modified:   data/members.csv 	renamed:    img/meng.jpg -> img/WXL_ITP.jpg 	new file:   img/hgao.jpg 	new file:   img/hytang.jpg 	modified:   img/member.pptx 	new file:   img/rgzhang.jpg 	new file:   img/xwang.jpg 	new file:   img/zlwang.jpg 	new file:   img/zxwang.jpg
</commit_message>
<xml_diff>
--- a/img/member.pptx
+++ b/img/member.pptx
@@ -6,6 +6,7 @@
   </p:sldMasterIdLst>
   <p:sldIdLst>
     <p:sldId id="256" r:id="rId2"/>
+    <p:sldId id="257" r:id="rId3"/>
   </p:sldIdLst>
   <p:sldSz cx="12192000" cy="6858000"/>
   <p:notesSz cx="6858000" cy="9144000"/>
@@ -270,7 +271,7 @@
           <a:p>
             <a:fld id="{26722B09-0315-4E75-BD8D-A0AB63D29779}" type="datetimeFigureOut">
               <a:rPr lang="zh-CN" altLang="en-US" smtClean="0"/>
-              <a:t>2021/8/24</a:t>
+              <a:t>2023/6/28</a:t>
             </a:fld>
             <a:endParaRPr lang="zh-CN" altLang="en-US"/>
           </a:p>
@@ -468,7 +469,7 @@
           <a:p>
             <a:fld id="{26722B09-0315-4E75-BD8D-A0AB63D29779}" type="datetimeFigureOut">
               <a:rPr lang="zh-CN" altLang="en-US" smtClean="0"/>
-              <a:t>2021/8/24</a:t>
+              <a:t>2023/6/28</a:t>
             </a:fld>
             <a:endParaRPr lang="zh-CN" altLang="en-US"/>
           </a:p>
@@ -676,7 +677,7 @@
           <a:p>
             <a:fld id="{26722B09-0315-4E75-BD8D-A0AB63D29779}" type="datetimeFigureOut">
               <a:rPr lang="zh-CN" altLang="en-US" smtClean="0"/>
-              <a:t>2021/8/24</a:t>
+              <a:t>2023/6/28</a:t>
             </a:fld>
             <a:endParaRPr lang="zh-CN" altLang="en-US"/>
           </a:p>
@@ -874,7 +875,7 @@
           <a:p>
             <a:fld id="{26722B09-0315-4E75-BD8D-A0AB63D29779}" type="datetimeFigureOut">
               <a:rPr lang="zh-CN" altLang="en-US" smtClean="0"/>
-              <a:t>2021/8/24</a:t>
+              <a:t>2023/6/28</a:t>
             </a:fld>
             <a:endParaRPr lang="zh-CN" altLang="en-US"/>
           </a:p>
@@ -1149,7 +1150,7 @@
           <a:p>
             <a:fld id="{26722B09-0315-4E75-BD8D-A0AB63D29779}" type="datetimeFigureOut">
               <a:rPr lang="zh-CN" altLang="en-US" smtClean="0"/>
-              <a:t>2021/8/24</a:t>
+              <a:t>2023/6/28</a:t>
             </a:fld>
             <a:endParaRPr lang="zh-CN" altLang="en-US"/>
           </a:p>
@@ -1414,7 +1415,7 @@
           <a:p>
             <a:fld id="{26722B09-0315-4E75-BD8D-A0AB63D29779}" type="datetimeFigureOut">
               <a:rPr lang="zh-CN" altLang="en-US" smtClean="0"/>
-              <a:t>2021/8/24</a:t>
+              <a:t>2023/6/28</a:t>
             </a:fld>
             <a:endParaRPr lang="zh-CN" altLang="en-US"/>
           </a:p>
@@ -1826,7 +1827,7 @@
           <a:p>
             <a:fld id="{26722B09-0315-4E75-BD8D-A0AB63D29779}" type="datetimeFigureOut">
               <a:rPr lang="zh-CN" altLang="en-US" smtClean="0"/>
-              <a:t>2021/8/24</a:t>
+              <a:t>2023/6/28</a:t>
             </a:fld>
             <a:endParaRPr lang="zh-CN" altLang="en-US"/>
           </a:p>
@@ -1967,7 +1968,7 @@
           <a:p>
             <a:fld id="{26722B09-0315-4E75-BD8D-A0AB63D29779}" type="datetimeFigureOut">
               <a:rPr lang="zh-CN" altLang="en-US" smtClean="0"/>
-              <a:t>2021/8/24</a:t>
+              <a:t>2023/6/28</a:t>
             </a:fld>
             <a:endParaRPr lang="zh-CN" altLang="en-US"/>
           </a:p>
@@ -2080,7 +2081,7 @@
           <a:p>
             <a:fld id="{26722B09-0315-4E75-BD8D-A0AB63D29779}" type="datetimeFigureOut">
               <a:rPr lang="zh-CN" altLang="en-US" smtClean="0"/>
-              <a:t>2021/8/24</a:t>
+              <a:t>2023/6/28</a:t>
             </a:fld>
             <a:endParaRPr lang="zh-CN" altLang="en-US"/>
           </a:p>
@@ -2391,7 +2392,7 @@
           <a:p>
             <a:fld id="{26722B09-0315-4E75-BD8D-A0AB63D29779}" type="datetimeFigureOut">
               <a:rPr lang="zh-CN" altLang="en-US" smtClean="0"/>
-              <a:t>2021/8/24</a:t>
+              <a:t>2023/6/28</a:t>
             </a:fld>
             <a:endParaRPr lang="zh-CN" altLang="en-US"/>
           </a:p>
@@ -2679,7 +2680,7 @@
           <a:p>
             <a:fld id="{26722B09-0315-4E75-BD8D-A0AB63D29779}" type="datetimeFigureOut">
               <a:rPr lang="zh-CN" altLang="en-US" smtClean="0"/>
-              <a:t>2021/8/24</a:t>
+              <a:t>2023/6/28</a:t>
             </a:fld>
             <a:endParaRPr lang="zh-CN" altLang="en-US"/>
           </a:p>
@@ -2920,7 +2921,7 @@
           <a:p>
             <a:fld id="{26722B09-0315-4E75-BD8D-A0AB63D29779}" type="datetimeFigureOut">
               <a:rPr lang="zh-CN" altLang="en-US" smtClean="0"/>
-              <a:t>2021/8/24</a:t>
+              <a:t>2023/6/28</a:t>
             </a:fld>
             <a:endParaRPr lang="zh-CN" altLang="en-US"/>
           </a:p>
@@ -3337,95 +3338,16 @@
           <a:chExt cx="0" cy="0"/>
         </a:xfrm>
       </p:grpSpPr>
-      <p:sp>
-        <p:nvSpPr>
-          <p:cNvPr id="2" name="标题 1">
-            <a:extLst>
-              <a:ext uri="{FF2B5EF4-FFF2-40B4-BE49-F238E27FC236}">
-                <a16:creationId xmlns:a16="http://schemas.microsoft.com/office/drawing/2014/main" id="{1D9A3C2E-3A95-4F2F-8A12-3AB0448AC997}"/>
-              </a:ext>
-            </a:extLst>
-          </p:cNvPr>
-          <p:cNvSpPr>
-            <a:spLocks noGrp="1"/>
-          </p:cNvSpPr>
-          <p:nvPr>
-            <p:ph type="ctrTitle"/>
-          </p:nvPr>
-        </p:nvSpPr>
-        <p:spPr/>
-        <p:txBody>
-          <a:bodyPr/>
-          <a:lstStyle/>
-          <a:p>
-            <a:endParaRPr lang="zh-CN" altLang="en-US"/>
-          </a:p>
-        </p:txBody>
-      </p:sp>
-      <p:sp>
-        <p:nvSpPr>
-          <p:cNvPr id="3" name="副标题 2">
-            <a:extLst>
-              <a:ext uri="{FF2B5EF4-FFF2-40B4-BE49-F238E27FC236}">
-                <a16:creationId xmlns:a16="http://schemas.microsoft.com/office/drawing/2014/main" id="{8322740B-927B-49EE-B2AB-8BB4FDA5248D}"/>
-              </a:ext>
-            </a:extLst>
-          </p:cNvPr>
-          <p:cNvSpPr>
-            <a:spLocks noGrp="1"/>
-          </p:cNvSpPr>
-          <p:nvPr>
-            <p:ph type="subTitle" idx="1"/>
-          </p:nvPr>
-        </p:nvSpPr>
-        <p:spPr/>
-        <p:txBody>
-          <a:bodyPr/>
-          <a:lstStyle/>
-          <a:p>
-            <a:endParaRPr lang="zh-CN" altLang="en-US"/>
-          </a:p>
-        </p:txBody>
-      </p:sp>
       <p:pic>
         <p:nvPicPr>
-          <p:cNvPr id="8" name="图片 7"/>
-          <p:cNvPicPr>
-            <a:picLocks noChangeAspect="1"/>
-          </p:cNvPicPr>
-          <p:nvPr/>
-        </p:nvPicPr>
-        <p:blipFill rotWithShape="1">
-          <a:blip r:embed="rId2" cstate="hqprint">
-            <a:extLst>
-              <a:ext uri="{28A0092B-C50C-407E-A947-70E740481C1C}">
-                <a14:useLocalDpi xmlns:a14="http://schemas.microsoft.com/office/drawing/2010/main" val="0"/>
-              </a:ext>
-            </a:extLst>
-          </a:blip>
-          <a:srcRect l="-10606" t="-2" r="-12222" b="6553"/>
-          <a:stretch/>
-        </p:blipFill>
-        <p:spPr>
-          <a:xfrm>
-            <a:off x="9005455" y="448107"/>
-            <a:ext cx="390372" cy="388800"/>
-          </a:xfrm>
-          <a:prstGeom prst="rect">
-            <a:avLst/>
-          </a:prstGeom>
-        </p:spPr>
-      </p:pic>
-      <p:pic>
-        <p:nvPicPr>
-          <p:cNvPr id="6" name="图片 5"/>
+          <p:cNvPr id="7" name="图片 6"/>
           <p:cNvPicPr>
             <a:picLocks noChangeAspect="1"/>
           </p:cNvPicPr>
           <p:nvPr/>
         </p:nvPicPr>
         <p:blipFill>
-          <a:blip r:embed="rId3">
+          <a:blip r:embed="rId2">
             <a:extLst>
               <a:ext uri="{28A0092B-C50C-407E-A947-70E740481C1C}">
                 <a14:useLocalDpi xmlns:a14="http://schemas.microsoft.com/office/drawing/2010/main" val="0"/>
@@ -3438,126 +3360,8 @@
         </p:blipFill>
         <p:spPr>
           <a:xfrm>
-            <a:off x="5900928" y="3233928"/>
-            <a:ext cx="390144" cy="390144"/>
-          </a:xfrm>
-          <a:prstGeom prst="rect">
-            <a:avLst/>
-          </a:prstGeom>
-        </p:spPr>
-      </p:pic>
-      <p:pic>
-        <p:nvPicPr>
-          <p:cNvPr id="4" name="图片 3"/>
-          <p:cNvPicPr>
-            <a:picLocks noChangeAspect="1"/>
-          </p:cNvPicPr>
-          <p:nvPr/>
-        </p:nvPicPr>
-        <p:blipFill>
-          <a:blip r:embed="rId4">
-            <a:extLst>
-              <a:ext uri="{28A0092B-C50C-407E-A947-70E740481C1C}">
-                <a14:useLocalDpi xmlns:a14="http://schemas.microsoft.com/office/drawing/2010/main" val="0"/>
-              </a:ext>
-            </a:extLst>
-          </a:blip>
-          <a:stretch>
-            <a:fillRect/>
-          </a:stretch>
-        </p:blipFill>
-        <p:spPr>
-          <a:xfrm>
-            <a:off x="8387841" y="1369646"/>
-            <a:ext cx="812800" cy="812800"/>
-          </a:xfrm>
-          <a:prstGeom prst="rect">
-            <a:avLst/>
-          </a:prstGeom>
-        </p:spPr>
-      </p:pic>
-      <p:pic>
-        <p:nvPicPr>
-          <p:cNvPr id="5" name="图片 4"/>
-          <p:cNvPicPr>
-            <a:picLocks noChangeAspect="1"/>
-          </p:cNvPicPr>
-          <p:nvPr/>
-        </p:nvPicPr>
-        <p:blipFill rotWithShape="1">
-          <a:blip r:embed="rId5">
-            <a:extLst>
-              <a:ext uri="{28A0092B-C50C-407E-A947-70E740481C1C}">
-                <a14:useLocalDpi xmlns:a14="http://schemas.microsoft.com/office/drawing/2010/main" val="0"/>
-              </a:ext>
-            </a:extLst>
-          </a:blip>
-          <a:srcRect l="-15830" t="1" r="-2486" b="5965"/>
-          <a:stretch/>
-        </p:blipFill>
-        <p:spPr>
-          <a:xfrm>
-            <a:off x="7272175" y="393021"/>
-            <a:ext cx="391351" cy="388800"/>
-          </a:xfrm>
-          <a:prstGeom prst="rect">
-            <a:avLst/>
-          </a:prstGeom>
-        </p:spPr>
-      </p:pic>
-      <p:pic>
-        <p:nvPicPr>
-          <p:cNvPr id="9" name="图片 8"/>
-          <p:cNvPicPr>
-            <a:picLocks noChangeAspect="1"/>
-          </p:cNvPicPr>
-          <p:nvPr/>
-        </p:nvPicPr>
-        <p:blipFill rotWithShape="1">
-          <a:blip r:embed="rId6">
-            <a:extLst>
-              <a:ext uri="{28A0092B-C50C-407E-A947-70E740481C1C}">
-                <a14:useLocalDpi xmlns:a14="http://schemas.microsoft.com/office/drawing/2010/main" val="0"/>
-              </a:ext>
-            </a:extLst>
-          </a:blip>
-          <a:srcRect l="2690" t="3367" r="-2690" b="-3367"/>
-          <a:stretch/>
-        </p:blipFill>
-        <p:spPr>
-          <a:xfrm>
-            <a:off x="1947392" y="173039"/>
-            <a:ext cx="5130000" cy="6831577"/>
-          </a:xfrm>
-          <a:prstGeom prst="rect">
-            <a:avLst/>
-          </a:prstGeom>
-        </p:spPr>
-      </p:pic>
-      <p:pic>
-        <p:nvPicPr>
-          <p:cNvPr id="10" name="图片 9"/>
-          <p:cNvPicPr>
-            <a:picLocks noChangeAspect="1"/>
-          </p:cNvPicPr>
-          <p:nvPr/>
-        </p:nvPicPr>
-        <p:blipFill>
-          <a:blip r:embed="rId7">
-            <a:extLst>
-              <a:ext uri="{28A0092B-C50C-407E-A947-70E740481C1C}">
-                <a14:useLocalDpi xmlns:a14="http://schemas.microsoft.com/office/drawing/2010/main" val="0"/>
-              </a:ext>
-            </a:extLst>
-          </a:blip>
-          <a:stretch>
-            <a:fillRect/>
-          </a:stretch>
-        </p:blipFill>
-        <p:spPr>
-          <a:xfrm>
-            <a:off x="7105970" y="-33528"/>
-            <a:ext cx="5130609" cy="6858000"/>
+            <a:off x="1224396" y="-43873"/>
+            <a:ext cx="5143500" cy="6858000"/>
           </a:xfrm>
           <a:prstGeom prst="rect">
             <a:avLst/>
@@ -3568,6 +3372,36 @@
     <p:extLst>
       <p:ext uri="{BB962C8B-B14F-4D97-AF65-F5344CB8AC3E}">
         <p14:creationId xmlns:p14="http://schemas.microsoft.com/office/powerpoint/2010/main" val="3734100387"/>
+      </p:ext>
+    </p:extLst>
+  </p:cSld>
+  <p:clrMapOvr>
+    <a:masterClrMapping/>
+  </p:clrMapOvr>
+</p:sld>
+</file>
+
+<file path=ppt/slides/slide2.xml><?xml version="1.0" encoding="utf-8"?>
+<p:sld xmlns:a="http://schemas.openxmlformats.org/drawingml/2006/main" xmlns:r="http://schemas.openxmlformats.org/officeDocument/2006/relationships" xmlns:p="http://schemas.openxmlformats.org/presentationml/2006/main">
+  <p:cSld>
+    <p:spTree>
+      <p:nvGrpSpPr>
+        <p:cNvPr id="1" name=""/>
+        <p:cNvGrpSpPr/>
+        <p:nvPr/>
+      </p:nvGrpSpPr>
+      <p:grpSpPr>
+        <a:xfrm>
+          <a:off x="0" y="0"/>
+          <a:ext cx="0" cy="0"/>
+          <a:chOff x="0" y="0"/>
+          <a:chExt cx="0" cy="0"/>
+        </a:xfrm>
+      </p:grpSpPr>
+    </p:spTree>
+    <p:extLst>
+      <p:ext uri="{BB962C8B-B14F-4D97-AF65-F5344CB8AC3E}">
+        <p14:creationId xmlns:p14="http://schemas.microsoft.com/office/powerpoint/2010/main" val="3058313064"/>
       </p:ext>
     </p:extLst>
   </p:cSld>

</xml_diff>